<commit_message>
[cpp20] adding ex06-matrix_solution.cpp, updating slides
</commit_message>
<xml_diff>
--- a/data/2020-21/cpp/ex06_v1.pptx
+++ b/data/2020-21/cpp/ex06_v1.pptx
@@ -12000,15 +12000,7 @@
             </a:r>
             <a:r>
               <a:rPr lang="en-US" sz="6000" dirty="0" smtClean="0"/>
-              <a:t>11</a:t>
-            </a:r>
-            <a:r>
-              <a:rPr lang="en-US" sz="6000" dirty="0" smtClean="0"/>
-              <a:t>.11.2020</a:t>
-            </a:r>
-            <a:r>
-              <a:rPr lang="en-US" sz="6000" dirty="0" smtClean="0"/>
-              <a:t>)</a:t>
+              <a:t>11.11.2020)</a:t>
             </a:r>
             <a:endParaRPr lang="cs-CZ" sz="6000" dirty="0"/>
           </a:p>
@@ -17529,12 +17521,6 @@
               </a:rPr>
               <a:t> }</a:t>
             </a:r>
-            <a:r>
-              <a:rPr lang="en-US" sz="1600" dirty="0" smtClean="0">
-                <a:latin typeface="Consolas" panose="020B0609020204030204" pitchFamily="49" charset="0"/>
-              </a:rPr>
-              <a:t/>
-            </a:r>
             <a:br>
               <a:rPr lang="en-US" sz="1600" dirty="0" smtClean="0">
                 <a:latin typeface="Consolas" panose="020B0609020204030204" pitchFamily="49" charset="0"/>
@@ -17640,9 +17626,6 @@
               </a:rPr>
               <a:t> }</a:t>
             </a:r>
-            <a:endParaRPr lang="en-US" sz="1600" dirty="0" smtClean="0">
-              <a:latin typeface="Consolas" panose="020B0609020204030204" pitchFamily="49" charset="0"/>
-            </a:endParaRPr>
           </a:p>
           <a:p>
             <a:r>
@@ -19354,7 +19337,27 @@
           <a:p>
             <a:r>
               <a:rPr lang="cs-CZ" sz="3200" dirty="0" smtClean="0"/>
-              <a:t>Úkol: databáze lidí</a:t>
+              <a:t>Úkol</a:t>
+            </a:r>
+            <a:r>
+              <a:rPr lang="en-US" sz="3200" dirty="0" smtClean="0"/>
+              <a:t> (</a:t>
+            </a:r>
+            <a:r>
+              <a:rPr lang="cs-CZ" sz="3200" dirty="0" smtClean="0"/>
+              <a:t>volitelně): </a:t>
+            </a:r>
+            <a:r>
+              <a:rPr lang="cs-CZ" sz="3200" dirty="0" smtClean="0"/>
+              <a:t>databáze </a:t>
+            </a:r>
+            <a:r>
+              <a:rPr lang="cs-CZ" sz="3200" dirty="0" smtClean="0"/>
+              <a:t>lidí</a:t>
+            </a:r>
+            <a:r>
+              <a:rPr lang="en-US" sz="3200" dirty="0" smtClean="0"/>
+              <a:t> </a:t>
             </a:r>
             <a:endParaRPr lang="cs-CZ" sz="3200" dirty="0"/>
           </a:p>

</xml_diff>